<commit_message>
Added slides for 12 factor methodology, and included Matt Stine's (pdf) presentation from #archconf
</commit_message>
<xml_diff>
--- a/FannieMaeArchConfTakeaways.pptx
+++ b/FannieMaeArchConfTakeaways.pptx
@@ -5,7 +5,7 @@
     <p:sldMasterId id="2147483648" r:id="rId1"/>
   </p:sldMasterIdLst>
   <p:notesMasterIdLst>
-    <p:notesMasterId r:id="rId13"/>
+    <p:notesMasterId r:id="rId16"/>
   </p:notesMasterIdLst>
   <p:sldIdLst>
     <p:sldId id="256" r:id="rId2"/>
@@ -14,11 +14,14 @@
     <p:sldId id="263" r:id="rId5"/>
     <p:sldId id="266" r:id="rId6"/>
     <p:sldId id="267" r:id="rId7"/>
-    <p:sldId id="265" r:id="rId8"/>
-    <p:sldId id="258" r:id="rId9"/>
-    <p:sldId id="260" r:id="rId10"/>
-    <p:sldId id="261" r:id="rId11"/>
-    <p:sldId id="262" r:id="rId12"/>
+    <p:sldId id="268" r:id="rId8"/>
+    <p:sldId id="269" r:id="rId9"/>
+    <p:sldId id="270" r:id="rId10"/>
+    <p:sldId id="265" r:id="rId11"/>
+    <p:sldId id="258" r:id="rId12"/>
+    <p:sldId id="260" r:id="rId13"/>
+    <p:sldId id="261" r:id="rId14"/>
+    <p:sldId id="262" r:id="rId15"/>
   </p:sldIdLst>
   <p:sldSz cx="9144000" cy="6858000" type="screen4x3"/>
   <p:notesSz cx="6858000" cy="9144000"/>
@@ -117,7 +120,49 @@
       </a:defRPr>
     </a:lvl9pPr>
   </p:defaultTextStyle>
+  <p:extLst>
+    <p:ext uri="{EFAFB233-063F-42B5-8137-9DF3F51BA10A}">
+      <p15:sldGuideLst xmlns:p15="http://schemas.microsoft.com/office/powerpoint/2012/main">
+        <p15:guide id="1" orient="horz" pos="2160">
+          <p15:clr>
+            <a:srgbClr val="A4A3A4"/>
+          </p15:clr>
+        </p15:guide>
+        <p15:guide id="2" pos="2880">
+          <p15:clr>
+            <a:srgbClr val="A4A3A4"/>
+          </p15:clr>
+        </p15:guide>
+      </p15:sldGuideLst>
+    </p:ext>
+  </p:extLst>
 </p:presentation>
+</file>
+
+<file path=ppt/commentAuthors.xml><?xml version="1.0" encoding="utf-8"?>
+<p:cmAuthorLst xmlns:a="http://schemas.openxmlformats.org/drawingml/2006/main" xmlns:r="http://schemas.openxmlformats.org/officeDocument/2006/relationships" xmlns:p="http://schemas.openxmlformats.org/presentationml/2006/main">
+  <p:cmAuthor id="1" name="Scott Nestor" initials="SN" lastIdx="1" clrIdx="0">
+    <p:extLst>
+      <p:ext uri="{19B8F6BF-5375-455C-9EA6-DF929625EA0E}">
+        <p15:presenceInfo xmlns:p15="http://schemas.microsoft.com/office/powerpoint/2012/main" userId="" providerId=""/>
+      </p:ext>
+    </p:extLst>
+  </p:cmAuthor>
+</p:cmAuthorLst>
+</file>
+
+<file path=ppt/comments/comment1.xml><?xml version="1.0" encoding="utf-8"?>
+<p:cmLst xmlns:a="http://schemas.openxmlformats.org/drawingml/2006/main" xmlns:r="http://schemas.openxmlformats.org/officeDocument/2006/relationships" xmlns:p="http://schemas.openxmlformats.org/presentationml/2006/main">
+  <p:cm authorId="1" dt="2016-01-02T21:51:46.072" idx="1">
+    <p:pos x="10" y="10"/>
+    <p:text/>
+    <p:extLst>
+      <p:ext uri="{C676402C-5697-4E1C-873F-D02D1690AC5C}">
+        <p15:threadingInfo xmlns:p15="http://schemas.microsoft.com/office/powerpoint/2012/main" timeZoneBias="300"/>
+      </p:ext>
+    </p:extLst>
+  </p:cm>
+</p:cmLst>
 </file>
 
 <file path=ppt/notesMasters/notesMaster1.xml><?xml version="1.0" encoding="utf-8"?>
@@ -202,7 +247,7 @@
           <a:p>
             <a:fld id="{1577CFEA-91B5-1048-A360-788FD08E9AAD}" type="datetimeFigureOut">
               <a:rPr lang="en-US" smtClean="0"/>
-              <a:t>1/1/16</a:t>
+              <a:t>1/2/16</a:t>
             </a:fld>
             <a:endParaRPr lang="en-US"/>
           </a:p>
@@ -1055,92 +1100,26 @@
           <a:bodyPr/>
           <a:lstStyle/>
           <a:p>
-            <a:pPr marL="0" marR="0" indent="0" algn="l" defTabSz="457200" rtl="0" eaLnBrk="1" fontAlgn="auto" latinLnBrk="0" hangingPunct="1">
-              <a:lnSpc>
-                <a:spcPct val="100000"/>
-              </a:lnSpc>
-              <a:spcBef>
-                <a:spcPts val="0"/>
-              </a:spcBef>
-              <a:spcAft>
-                <a:spcPts val="0"/>
-              </a:spcAft>
-              <a:buClrTx/>
-              <a:buSzTx/>
-              <a:buFontTx/>
-              <a:buNone/>
-              <a:tabLst/>
-              <a:defRPr/>
-            </a:pPr>
-            <a:r>
-              <a:rPr lang="en-US" dirty="0" smtClean="0"/>
-              <a:t>Definition of ‘cloud’ includes </a:t>
-            </a:r>
-            <a:r>
-              <a:rPr lang="en-US" sz="1200" kern="1200" dirty="0" smtClean="0">
-                <a:solidFill>
-                  <a:schemeClr val="tx1"/>
-                </a:solidFill>
-                <a:effectLst/>
-                <a:latin typeface="+mn-lt"/>
-                <a:ea typeface="+mn-ea"/>
-                <a:cs typeface="+mn-cs"/>
-              </a:rPr>
-              <a:t>both public cloud infrastructure (such as Amazon Web Services, Google Cloud, or Microsoft Azure) and private cloud infrastructure (such as VMware </a:t>
-            </a:r>
-            <a:r>
-              <a:rPr lang="en-US" sz="1200" kern="1200" dirty="0" err="1" smtClean="0">
-                <a:solidFill>
-                  <a:schemeClr val="tx1"/>
-                </a:solidFill>
-                <a:effectLst/>
-                <a:latin typeface="+mn-lt"/>
-                <a:ea typeface="+mn-ea"/>
-                <a:cs typeface="+mn-cs"/>
-              </a:rPr>
-              <a:t>vSphere</a:t>
-            </a:r>
-            <a:r>
-              <a:rPr lang="en-US" sz="1200" kern="1200" dirty="0" smtClean="0">
-                <a:solidFill>
-                  <a:schemeClr val="tx1"/>
-                </a:solidFill>
-                <a:effectLst/>
-                <a:latin typeface="+mn-lt"/>
-                <a:ea typeface="+mn-ea"/>
-                <a:cs typeface="+mn-cs"/>
-              </a:rPr>
-              <a:t> or </a:t>
-            </a:r>
-            <a:r>
-              <a:rPr lang="en-US" sz="1200" kern="1200" dirty="0" err="1" smtClean="0">
-                <a:solidFill>
-                  <a:schemeClr val="tx1"/>
-                </a:solidFill>
-                <a:effectLst/>
-                <a:latin typeface="+mn-lt"/>
-                <a:ea typeface="+mn-ea"/>
-                <a:cs typeface="+mn-cs"/>
-              </a:rPr>
-              <a:t>OpenStack</a:t>
-            </a:r>
-            <a:r>
-              <a:rPr lang="en-US" sz="1200" kern="1200" dirty="0" smtClean="0">
-                <a:solidFill>
-                  <a:schemeClr val="tx1"/>
-                </a:solidFill>
-                <a:effectLst/>
-                <a:latin typeface="+mn-lt"/>
-                <a:ea typeface="+mn-ea"/>
-                <a:cs typeface="+mn-cs"/>
-              </a:rPr>
-              <a:t>). </a:t>
-            </a:r>
-            <a:endParaRPr lang="en-US" dirty="0" smtClean="0">
-              <a:effectLst/>
-            </a:endParaRPr>
-          </a:p>
-          <a:p>
+            <a:r>
+              <a:rPr lang="en-US" dirty="0" smtClean="0"/>
+              <a:t>12 factor apps </a:t>
+            </a:r>
+            <a:r>
+              <a:rPr lang="is-IS" dirty="0" smtClean="0"/>
+              <a:t>… phrase</a:t>
+            </a:r>
+            <a:r>
+              <a:rPr lang="is-IS" baseline="0" dirty="0" smtClean="0"/>
+              <a:t> coined by developers of Heroku.   Has become the </a:t>
+            </a:r>
+            <a:r>
+              <a:rPr lang="is-IS" i="1" baseline="0" dirty="0" smtClean="0"/>
+              <a:t>defacto</a:t>
+            </a:r>
+            <a:r>
+              <a:rPr lang="is-IS" baseline="0" dirty="0" smtClean="0"/>
+              <a:t> approach for distributed, cloud based services (microservices).</a:t>
+            </a:r>
             <a:endParaRPr lang="en-US" dirty="0"/>
           </a:p>
         </p:txBody>
@@ -1162,7 +1141,7 @@
           <a:p>
             <a:fld id="{4A9D8C0A-C076-214D-A2D0-732BBC5FCAE2}" type="slidenum">
               <a:rPr lang="en-US" smtClean="0"/>
-              <a:t>8</a:t>
+              <a:t>7</a:t>
             </a:fld>
             <a:endParaRPr lang="en-US"/>
           </a:p>
@@ -1171,7 +1150,7 @@
     </p:spTree>
     <p:extLst>
       <p:ext uri="{BB962C8B-B14F-4D97-AF65-F5344CB8AC3E}">
-        <p14:creationId xmlns:p14="http://schemas.microsoft.com/office/powerpoint/2010/main" val="4283456988"/>
+        <p14:creationId xmlns:p14="http://schemas.microsoft.com/office/powerpoint/2010/main" val="671972132"/>
       </p:ext>
     </p:extLst>
   </p:cSld>
@@ -1225,6 +1204,528 @@
           <a:bodyPr/>
           <a:lstStyle/>
           <a:p>
+            <a:endParaRPr lang="en-US" dirty="0"/>
+          </a:p>
+        </p:txBody>
+      </p:sp>
+      <p:sp>
+        <p:nvSpPr>
+          <p:cNvPr id="4" name="Slide Number Placeholder 3"/>
+          <p:cNvSpPr>
+            <a:spLocks noGrp="1"/>
+          </p:cNvSpPr>
+          <p:nvPr>
+            <p:ph type="sldNum" sz="quarter" idx="10"/>
+          </p:nvPr>
+        </p:nvSpPr>
+        <p:spPr/>
+        <p:txBody>
+          <a:bodyPr/>
+          <a:lstStyle/>
+          <a:p>
+            <a:fld id="{4A9D8C0A-C076-214D-A2D0-732BBC5FCAE2}" type="slidenum">
+              <a:rPr lang="en-US" smtClean="0"/>
+              <a:t>8</a:t>
+            </a:fld>
+            <a:endParaRPr lang="en-US"/>
+          </a:p>
+        </p:txBody>
+      </p:sp>
+    </p:spTree>
+    <p:extLst>
+      <p:ext uri="{BB962C8B-B14F-4D97-AF65-F5344CB8AC3E}">
+        <p14:creationId xmlns:p14="http://schemas.microsoft.com/office/powerpoint/2010/main" val="2009455415"/>
+      </p:ext>
+    </p:extLst>
+  </p:cSld>
+  <p:clrMapOvr>
+    <a:masterClrMapping/>
+  </p:clrMapOvr>
+</p:notes>
+</file>
+
+<file path=ppt/notesSlides/notesSlide4.xml><?xml version="1.0" encoding="utf-8"?>
+<p:notes xmlns:a="http://schemas.openxmlformats.org/drawingml/2006/main" xmlns:r="http://schemas.openxmlformats.org/officeDocument/2006/relationships" xmlns:p="http://schemas.openxmlformats.org/presentationml/2006/main">
+  <p:cSld>
+    <p:spTree>
+      <p:nvGrpSpPr>
+        <p:cNvPr id="1" name=""/>
+        <p:cNvGrpSpPr/>
+        <p:nvPr/>
+      </p:nvGrpSpPr>
+      <p:grpSpPr>
+        <a:xfrm>
+          <a:off x="0" y="0"/>
+          <a:ext cx="0" cy="0"/>
+          <a:chOff x="0" y="0"/>
+          <a:chExt cx="0" cy="0"/>
+        </a:xfrm>
+      </p:grpSpPr>
+      <p:sp>
+        <p:nvSpPr>
+          <p:cNvPr id="2" name="Slide Image Placeholder 1"/>
+          <p:cNvSpPr>
+            <a:spLocks noGrp="1" noRot="1" noChangeAspect="1"/>
+          </p:cNvSpPr>
+          <p:nvPr>
+            <p:ph type="sldImg"/>
+          </p:nvPr>
+        </p:nvSpPr>
+        <p:spPr/>
+      </p:sp>
+      <p:sp>
+        <p:nvSpPr>
+          <p:cNvPr id="3" name="Notes Placeholder 2"/>
+          <p:cNvSpPr>
+            <a:spLocks noGrp="1"/>
+          </p:cNvSpPr>
+          <p:nvPr>
+            <p:ph type="body" idx="1"/>
+          </p:nvPr>
+        </p:nvSpPr>
+        <p:spPr/>
+        <p:txBody>
+          <a:bodyPr/>
+          <a:lstStyle/>
+          <a:p>
+            <a:pPr marL="171450" indent="-171450">
+              <a:buFontTx/>
+              <a:buChar char="-"/>
+            </a:pPr>
+            <a:r>
+              <a:rPr lang="en-US" dirty="0" smtClean="0"/>
+              <a:t>Most</a:t>
+            </a:r>
+            <a:r>
+              <a:rPr lang="en-US" baseline="0" dirty="0" smtClean="0"/>
+              <a:t> FNM apps already doing the first two (hopefully) </a:t>
+            </a:r>
+            <a:r>
+              <a:rPr lang="is-IS" baseline="0" dirty="0" smtClean="0"/>
+              <a:t>… e.g., CVS, CC, or SVN (repos) and Maven</a:t>
+            </a:r>
+            <a:br>
+              <a:rPr lang="is-IS" baseline="0" dirty="0" smtClean="0"/>
+            </a:br>
+            <a:r>
+              <a:rPr lang="is-IS" baseline="0" dirty="0" smtClean="0"/>
+              <a:t>Note: </a:t>
+            </a:r>
+            <a:r>
+              <a:rPr lang="en-US" baseline="0" dirty="0" smtClean="0">
+                <a:solidFill>
+                  <a:srgbClr val="FF0000"/>
+                </a:solidFill>
+              </a:rPr>
+              <a:t>Should move to </a:t>
+            </a:r>
+            <a:r>
+              <a:rPr lang="en-US" baseline="0" dirty="0" err="1" smtClean="0">
+                <a:solidFill>
+                  <a:srgbClr val="FF0000"/>
+                </a:solidFill>
+              </a:rPr>
+              <a:t>git</a:t>
+            </a:r>
+            <a:r>
+              <a:rPr lang="en-US" baseline="0" dirty="0" smtClean="0">
+                <a:solidFill>
+                  <a:srgbClr val="FF0000"/>
+                </a:solidFill>
+              </a:rPr>
+              <a:t> and Spring Boot</a:t>
+            </a:r>
+          </a:p>
+          <a:p>
+            <a:pPr marL="171450" indent="-171450">
+              <a:buFontTx/>
+              <a:buChar char="-"/>
+            </a:pPr>
+            <a:r>
+              <a:rPr lang="en-US" baseline="0" dirty="0" err="1" smtClean="0"/>
+              <a:t>Config</a:t>
+            </a:r>
+            <a:r>
+              <a:rPr lang="en-US" baseline="0" dirty="0" smtClean="0"/>
+              <a:t> in the </a:t>
+            </a:r>
+            <a:r>
+              <a:rPr lang="en-US" baseline="0" dirty="0" err="1" smtClean="0"/>
+              <a:t>env</a:t>
+            </a:r>
+            <a:r>
+              <a:rPr lang="en-US" baseline="0" dirty="0" smtClean="0"/>
+              <a:t> doesn’t mean property files or DB.  Need </a:t>
+            </a:r>
+            <a:r>
+              <a:rPr lang="en-US" baseline="0" dirty="0" err="1" smtClean="0"/>
+              <a:t>env</a:t>
+            </a:r>
+            <a:r>
+              <a:rPr lang="en-US" baseline="0" dirty="0" smtClean="0"/>
+              <a:t> variables, or </a:t>
+            </a:r>
+            <a:r>
+              <a:rPr lang="en-US" baseline="0" dirty="0" err="1" smtClean="0"/>
+              <a:t>config</a:t>
+            </a:r>
+            <a:r>
+              <a:rPr lang="en-US" baseline="0" dirty="0" smtClean="0"/>
+              <a:t> server (versioned, and language agnostic)</a:t>
+            </a:r>
+          </a:p>
+          <a:p>
+            <a:pPr marL="171450" indent="-171450">
+              <a:buFontTx/>
+              <a:buChar char="-"/>
+            </a:pPr>
+            <a:r>
+              <a:rPr lang="is-IS" baseline="0" dirty="0" smtClean="0"/>
+              <a:t>Backing services – swappable, no distinction between local and 3rd party</a:t>
+            </a:r>
+          </a:p>
+          <a:p>
+            <a:pPr marL="171450" indent="-171450">
+              <a:buFontTx/>
+              <a:buChar char="-"/>
+            </a:pPr>
+            <a:r>
+              <a:rPr lang="is-IS" baseline="0" dirty="0" smtClean="0"/>
+              <a:t>Build, release, run – partially there with Maven, but env dependency assumptions still there</a:t>
+            </a:r>
+            <a:br>
+              <a:rPr lang="is-IS" baseline="0" dirty="0" smtClean="0"/>
+            </a:br>
+            <a:r>
+              <a:rPr lang="is-IS" baseline="0" dirty="0" smtClean="0"/>
+              <a:t>Note: Need to move to Docker (or Chef)</a:t>
+            </a:r>
+          </a:p>
+          <a:p>
+            <a:pPr marL="171450" indent="-171450">
+              <a:buFontTx/>
+              <a:buChar char="-"/>
+            </a:pPr>
+            <a:r>
+              <a:rPr lang="is-IS" baseline="0" dirty="0" smtClean="0"/>
+              <a:t>Processes – </a:t>
+            </a:r>
+            <a:r>
+              <a:rPr lang="is-IS" b="1" baseline="0" dirty="0" smtClean="0"/>
+              <a:t>State adds complexity (scaling, consistency)</a:t>
+            </a:r>
+            <a:br>
+              <a:rPr lang="is-IS" b="1" baseline="0" dirty="0" smtClean="0"/>
+            </a:br>
+            <a:r>
+              <a:rPr lang="is-IS" b="0" baseline="0" dirty="0" smtClean="0"/>
+              <a:t>Note:  Use Spring for session management</a:t>
+            </a:r>
+          </a:p>
+          <a:p>
+            <a:pPr marL="171450" indent="-171450">
+              <a:buFontTx/>
+              <a:buChar char="-"/>
+            </a:pPr>
+            <a:r>
+              <a:rPr lang="is-IS" b="0" baseline="0" dirty="0" smtClean="0"/>
+              <a:t>Port Binding – Bring your own container (TC, Jetty, etc.)</a:t>
+            </a:r>
+          </a:p>
+          <a:p>
+            <a:pPr marL="171450" indent="-171450">
+              <a:buFontTx/>
+              <a:buChar char="-"/>
+            </a:pPr>
+            <a:r>
+              <a:rPr lang="is-IS" b="0" baseline="0" dirty="0" smtClean="0"/>
+              <a:t>Concurrency – More processes, less multiplexing</a:t>
+            </a:r>
+          </a:p>
+          <a:p>
+            <a:pPr marL="171450" indent="-171450">
+              <a:buFontTx/>
+              <a:buChar char="-"/>
+            </a:pPr>
+            <a:r>
+              <a:rPr lang="is-IS" b="0" baseline="0" dirty="0" smtClean="0"/>
+              <a:t>Disposibility – “Crash Well”</a:t>
+            </a:r>
+          </a:p>
+          <a:p>
+            <a:pPr marL="171450" indent="-171450">
+              <a:buFontTx/>
+              <a:buChar char="-"/>
+            </a:pPr>
+            <a:r>
+              <a:rPr lang="is-IS" baseline="0" dirty="0" smtClean="0"/>
+              <a:t>Logs – ELK (logstash) ... </a:t>
+            </a:r>
+            <a:r>
+              <a:rPr lang="en-US" baseline="0" dirty="0" smtClean="0"/>
+              <a:t>Yeah!</a:t>
+            </a:r>
+            <a:endParaRPr lang="is-IS" baseline="0" dirty="0" smtClean="0"/>
+          </a:p>
+          <a:p>
+            <a:pPr marL="171450" indent="-171450">
+              <a:buFontTx/>
+              <a:buChar char="-"/>
+            </a:pPr>
+            <a:endParaRPr lang="is-IS" baseline="0" dirty="0" smtClean="0"/>
+          </a:p>
+        </p:txBody>
+      </p:sp>
+      <p:sp>
+        <p:nvSpPr>
+          <p:cNvPr id="4" name="Slide Number Placeholder 3"/>
+          <p:cNvSpPr>
+            <a:spLocks noGrp="1"/>
+          </p:cNvSpPr>
+          <p:nvPr>
+            <p:ph type="sldNum" sz="quarter" idx="10"/>
+          </p:nvPr>
+        </p:nvSpPr>
+        <p:spPr/>
+        <p:txBody>
+          <a:bodyPr/>
+          <a:lstStyle/>
+          <a:p>
+            <a:fld id="{4A9D8C0A-C076-214D-A2D0-732BBC5FCAE2}" type="slidenum">
+              <a:rPr lang="en-US" smtClean="0"/>
+              <a:t>9</a:t>
+            </a:fld>
+            <a:endParaRPr lang="en-US"/>
+          </a:p>
+        </p:txBody>
+      </p:sp>
+    </p:spTree>
+    <p:extLst>
+      <p:ext uri="{BB962C8B-B14F-4D97-AF65-F5344CB8AC3E}">
+        <p14:creationId xmlns:p14="http://schemas.microsoft.com/office/powerpoint/2010/main" val="75108121"/>
+      </p:ext>
+    </p:extLst>
+  </p:cSld>
+  <p:clrMapOvr>
+    <a:masterClrMapping/>
+  </p:clrMapOvr>
+</p:notes>
+</file>
+
+<file path=ppt/notesSlides/notesSlide5.xml><?xml version="1.0" encoding="utf-8"?>
+<p:notes xmlns:a="http://schemas.openxmlformats.org/drawingml/2006/main" xmlns:r="http://schemas.openxmlformats.org/officeDocument/2006/relationships" xmlns:p="http://schemas.openxmlformats.org/presentationml/2006/main">
+  <p:cSld>
+    <p:spTree>
+      <p:nvGrpSpPr>
+        <p:cNvPr id="1" name=""/>
+        <p:cNvGrpSpPr/>
+        <p:nvPr/>
+      </p:nvGrpSpPr>
+      <p:grpSpPr>
+        <a:xfrm>
+          <a:off x="0" y="0"/>
+          <a:ext cx="0" cy="0"/>
+          <a:chOff x="0" y="0"/>
+          <a:chExt cx="0" cy="0"/>
+        </a:xfrm>
+      </p:grpSpPr>
+      <p:sp>
+        <p:nvSpPr>
+          <p:cNvPr id="2" name="Slide Image Placeholder 1"/>
+          <p:cNvSpPr>
+            <a:spLocks noGrp="1" noRot="1" noChangeAspect="1"/>
+          </p:cNvSpPr>
+          <p:nvPr>
+            <p:ph type="sldImg"/>
+          </p:nvPr>
+        </p:nvSpPr>
+        <p:spPr/>
+      </p:sp>
+      <p:sp>
+        <p:nvSpPr>
+          <p:cNvPr id="3" name="Notes Placeholder 2"/>
+          <p:cNvSpPr>
+            <a:spLocks noGrp="1"/>
+          </p:cNvSpPr>
+          <p:nvPr>
+            <p:ph type="body" idx="1"/>
+          </p:nvPr>
+        </p:nvSpPr>
+        <p:spPr/>
+        <p:txBody>
+          <a:bodyPr/>
+          <a:lstStyle/>
+          <a:p>
+            <a:pPr marL="0" marR="0" indent="0" algn="l" defTabSz="457200" rtl="0" eaLnBrk="1" fontAlgn="auto" latinLnBrk="0" hangingPunct="1">
+              <a:lnSpc>
+                <a:spcPct val="100000"/>
+              </a:lnSpc>
+              <a:spcBef>
+                <a:spcPts val="0"/>
+              </a:spcBef>
+              <a:spcAft>
+                <a:spcPts val="0"/>
+              </a:spcAft>
+              <a:buClrTx/>
+              <a:buSzTx/>
+              <a:buFontTx/>
+              <a:buNone/>
+              <a:tabLst/>
+              <a:defRPr/>
+            </a:pPr>
+            <a:r>
+              <a:rPr lang="en-US" dirty="0" smtClean="0"/>
+              <a:t>Definition of ‘cloud’ includes </a:t>
+            </a:r>
+            <a:r>
+              <a:rPr lang="en-US" sz="1200" kern="1200" dirty="0" smtClean="0">
+                <a:solidFill>
+                  <a:schemeClr val="tx1"/>
+                </a:solidFill>
+                <a:effectLst/>
+                <a:latin typeface="+mn-lt"/>
+                <a:ea typeface="+mn-ea"/>
+                <a:cs typeface="+mn-cs"/>
+              </a:rPr>
+              <a:t>both public cloud infrastructure (such as Amazon Web Services, Google Cloud, or Microsoft Azure) and private cloud infrastructure (such as VMware </a:t>
+            </a:r>
+            <a:r>
+              <a:rPr lang="en-US" sz="1200" kern="1200" dirty="0" err="1" smtClean="0">
+                <a:solidFill>
+                  <a:schemeClr val="tx1"/>
+                </a:solidFill>
+                <a:effectLst/>
+                <a:latin typeface="+mn-lt"/>
+                <a:ea typeface="+mn-ea"/>
+                <a:cs typeface="+mn-cs"/>
+              </a:rPr>
+              <a:t>vSphere</a:t>
+            </a:r>
+            <a:r>
+              <a:rPr lang="en-US" sz="1200" kern="1200" dirty="0" smtClean="0">
+                <a:solidFill>
+                  <a:schemeClr val="tx1"/>
+                </a:solidFill>
+                <a:effectLst/>
+                <a:latin typeface="+mn-lt"/>
+                <a:ea typeface="+mn-ea"/>
+                <a:cs typeface="+mn-cs"/>
+              </a:rPr>
+              <a:t> or </a:t>
+            </a:r>
+            <a:r>
+              <a:rPr lang="en-US" sz="1200" kern="1200" dirty="0" err="1" smtClean="0">
+                <a:solidFill>
+                  <a:schemeClr val="tx1"/>
+                </a:solidFill>
+                <a:effectLst/>
+                <a:latin typeface="+mn-lt"/>
+                <a:ea typeface="+mn-ea"/>
+                <a:cs typeface="+mn-cs"/>
+              </a:rPr>
+              <a:t>OpenStack</a:t>
+            </a:r>
+            <a:r>
+              <a:rPr lang="en-US" sz="1200" kern="1200" dirty="0" smtClean="0">
+                <a:solidFill>
+                  <a:schemeClr val="tx1"/>
+                </a:solidFill>
+                <a:effectLst/>
+                <a:latin typeface="+mn-lt"/>
+                <a:ea typeface="+mn-ea"/>
+                <a:cs typeface="+mn-cs"/>
+              </a:rPr>
+              <a:t>). </a:t>
+            </a:r>
+            <a:endParaRPr lang="en-US" dirty="0" smtClean="0">
+              <a:effectLst/>
+            </a:endParaRPr>
+          </a:p>
+          <a:p>
+            <a:endParaRPr lang="en-US" dirty="0"/>
+          </a:p>
+        </p:txBody>
+      </p:sp>
+      <p:sp>
+        <p:nvSpPr>
+          <p:cNvPr id="4" name="Slide Number Placeholder 3"/>
+          <p:cNvSpPr>
+            <a:spLocks noGrp="1"/>
+          </p:cNvSpPr>
+          <p:nvPr>
+            <p:ph type="sldNum" sz="quarter" idx="10"/>
+          </p:nvPr>
+        </p:nvSpPr>
+        <p:spPr/>
+        <p:txBody>
+          <a:bodyPr/>
+          <a:lstStyle/>
+          <a:p>
+            <a:fld id="{4A9D8C0A-C076-214D-A2D0-732BBC5FCAE2}" type="slidenum">
+              <a:rPr lang="en-US" smtClean="0"/>
+              <a:t>11</a:t>
+            </a:fld>
+            <a:endParaRPr lang="en-US"/>
+          </a:p>
+        </p:txBody>
+      </p:sp>
+    </p:spTree>
+    <p:extLst>
+      <p:ext uri="{BB962C8B-B14F-4D97-AF65-F5344CB8AC3E}">
+        <p14:creationId xmlns:p14="http://schemas.microsoft.com/office/powerpoint/2010/main" val="4283456988"/>
+      </p:ext>
+    </p:extLst>
+  </p:cSld>
+  <p:clrMapOvr>
+    <a:masterClrMapping/>
+  </p:clrMapOvr>
+</p:notes>
+</file>
+
+<file path=ppt/notesSlides/notesSlide6.xml><?xml version="1.0" encoding="utf-8"?>
+<p:notes xmlns:a="http://schemas.openxmlformats.org/drawingml/2006/main" xmlns:r="http://schemas.openxmlformats.org/officeDocument/2006/relationships" xmlns:p="http://schemas.openxmlformats.org/presentationml/2006/main">
+  <p:cSld>
+    <p:spTree>
+      <p:nvGrpSpPr>
+        <p:cNvPr id="1" name=""/>
+        <p:cNvGrpSpPr/>
+        <p:nvPr/>
+      </p:nvGrpSpPr>
+      <p:grpSpPr>
+        <a:xfrm>
+          <a:off x="0" y="0"/>
+          <a:ext cx="0" cy="0"/>
+          <a:chOff x="0" y="0"/>
+          <a:chExt cx="0" cy="0"/>
+        </a:xfrm>
+      </p:grpSpPr>
+      <p:sp>
+        <p:nvSpPr>
+          <p:cNvPr id="2" name="Slide Image Placeholder 1"/>
+          <p:cNvSpPr>
+            <a:spLocks noGrp="1" noRot="1" noChangeAspect="1"/>
+          </p:cNvSpPr>
+          <p:nvPr>
+            <p:ph type="sldImg"/>
+          </p:nvPr>
+        </p:nvSpPr>
+        <p:spPr/>
+      </p:sp>
+      <p:sp>
+        <p:nvSpPr>
+          <p:cNvPr id="3" name="Notes Placeholder 2"/>
+          <p:cNvSpPr>
+            <a:spLocks noGrp="1"/>
+          </p:cNvSpPr>
+          <p:nvPr>
+            <p:ph type="body" idx="1"/>
+          </p:nvPr>
+        </p:nvSpPr>
+        <p:spPr/>
+        <p:txBody>
+          <a:bodyPr/>
+          <a:lstStyle/>
+          <a:p>
             <a:pPr marL="0" marR="0" indent="0" algn="l" defTabSz="457200" rtl="0" eaLnBrk="1" fontAlgn="auto" latinLnBrk="0" hangingPunct="1">
               <a:lnSpc>
                 <a:spcPct val="100000"/>
@@ -1393,7 +1894,7 @@
           <a:p>
             <a:fld id="{4A9D8C0A-C076-214D-A2D0-732BBC5FCAE2}" type="slidenum">
               <a:rPr lang="en-US" smtClean="0"/>
-              <a:t>9</a:t>
+              <a:t>12</a:t>
             </a:fld>
             <a:endParaRPr lang="en-US"/>
           </a:p>
@@ -1412,7 +1913,7 @@
 </p:notes>
 </file>
 
-<file path=ppt/notesSlides/notesSlide4.xml><?xml version="1.0" encoding="utf-8"?>
+<file path=ppt/notesSlides/notesSlide7.xml><?xml version="1.0" encoding="utf-8"?>
 <p:notes xmlns:a="http://schemas.openxmlformats.org/drawingml/2006/main" xmlns:r="http://schemas.openxmlformats.org/officeDocument/2006/relationships" xmlns:p="http://schemas.openxmlformats.org/presentationml/2006/main">
   <p:cSld>
     <p:spTree>
@@ -1548,7 +2049,7 @@
           <a:p>
             <a:fld id="{4A9D8C0A-C076-214D-A2D0-732BBC5FCAE2}" type="slidenum">
               <a:rPr lang="en-US" smtClean="0"/>
-              <a:t>10</a:t>
+              <a:t>13</a:t>
             </a:fld>
             <a:endParaRPr lang="en-US"/>
           </a:p>
@@ -1567,7 +2068,7 @@
 </p:notes>
 </file>
 
-<file path=ppt/notesSlides/notesSlide5.xml><?xml version="1.0" encoding="utf-8"?>
+<file path=ppt/notesSlides/notesSlide8.xml><?xml version="1.0" encoding="utf-8"?>
 <p:notes xmlns:a="http://schemas.openxmlformats.org/drawingml/2006/main" xmlns:r="http://schemas.openxmlformats.org/officeDocument/2006/relationships" xmlns:p="http://schemas.openxmlformats.org/presentationml/2006/main">
   <p:cSld>
     <p:spTree>
@@ -1632,7 +2133,7 @@
           <a:p>
             <a:fld id="{4A9D8C0A-C076-214D-A2D0-732BBC5FCAE2}" type="slidenum">
               <a:rPr lang="en-US" smtClean="0"/>
-              <a:t>11</a:t>
+              <a:t>14</a:t>
             </a:fld>
             <a:endParaRPr lang="en-US"/>
           </a:p>
@@ -1832,7 +2333,7 @@
           <a:p>
             <a:fld id="{92122C78-872C-BD46-92C2-FE2D14519D25}" type="datetimeFigureOut">
               <a:rPr lang="en-US" smtClean="0"/>
-              <a:t>1/1/16</a:t>
+              <a:t>1/2/16</a:t>
             </a:fld>
             <a:endParaRPr lang="en-US"/>
           </a:p>
@@ -2002,7 +2503,7 @@
           <a:p>
             <a:fld id="{92122C78-872C-BD46-92C2-FE2D14519D25}" type="datetimeFigureOut">
               <a:rPr lang="en-US" smtClean="0"/>
-              <a:t>1/1/16</a:t>
+              <a:t>1/2/16</a:t>
             </a:fld>
             <a:endParaRPr lang="en-US"/>
           </a:p>
@@ -2182,7 +2683,7 @@
           <a:p>
             <a:fld id="{92122C78-872C-BD46-92C2-FE2D14519D25}" type="datetimeFigureOut">
               <a:rPr lang="en-US" smtClean="0"/>
-              <a:t>1/1/16</a:t>
+              <a:t>1/2/16</a:t>
             </a:fld>
             <a:endParaRPr lang="en-US"/>
           </a:p>
@@ -2352,7 +2853,7 @@
           <a:p>
             <a:fld id="{92122C78-872C-BD46-92C2-FE2D14519D25}" type="datetimeFigureOut">
               <a:rPr lang="en-US" smtClean="0"/>
-              <a:t>1/1/16</a:t>
+              <a:t>1/2/16</a:t>
             </a:fld>
             <a:endParaRPr lang="en-US"/>
           </a:p>
@@ -2598,7 +3099,7 @@
           <a:p>
             <a:fld id="{92122C78-872C-BD46-92C2-FE2D14519D25}" type="datetimeFigureOut">
               <a:rPr lang="en-US" smtClean="0"/>
-              <a:t>1/1/16</a:t>
+              <a:t>1/2/16</a:t>
             </a:fld>
             <a:endParaRPr lang="en-US"/>
           </a:p>
@@ -2886,7 +3387,7 @@
           <a:p>
             <a:fld id="{92122C78-872C-BD46-92C2-FE2D14519D25}" type="datetimeFigureOut">
               <a:rPr lang="en-US" smtClean="0"/>
-              <a:t>1/1/16</a:t>
+              <a:t>1/2/16</a:t>
             </a:fld>
             <a:endParaRPr lang="en-US"/>
           </a:p>
@@ -3308,7 +3809,7 @@
           <a:p>
             <a:fld id="{92122C78-872C-BD46-92C2-FE2D14519D25}" type="datetimeFigureOut">
               <a:rPr lang="en-US" smtClean="0"/>
-              <a:t>1/1/16</a:t>
+              <a:t>1/2/16</a:t>
             </a:fld>
             <a:endParaRPr lang="en-US"/>
           </a:p>
@@ -3426,7 +3927,7 @@
           <a:p>
             <a:fld id="{92122C78-872C-BD46-92C2-FE2D14519D25}" type="datetimeFigureOut">
               <a:rPr lang="en-US" smtClean="0"/>
-              <a:t>1/1/16</a:t>
+              <a:t>1/2/16</a:t>
             </a:fld>
             <a:endParaRPr lang="en-US"/>
           </a:p>
@@ -3521,7 +4022,7 @@
           <a:p>
             <a:fld id="{92122C78-872C-BD46-92C2-FE2D14519D25}" type="datetimeFigureOut">
               <a:rPr lang="en-US" smtClean="0"/>
-              <a:t>1/1/16</a:t>
+              <a:t>1/2/16</a:t>
             </a:fld>
             <a:endParaRPr lang="en-US"/>
           </a:p>
@@ -3798,7 +4299,7 @@
           <a:p>
             <a:fld id="{92122C78-872C-BD46-92C2-FE2D14519D25}" type="datetimeFigureOut">
               <a:rPr lang="en-US" smtClean="0"/>
-              <a:t>1/1/16</a:t>
+              <a:t>1/2/16</a:t>
             </a:fld>
             <a:endParaRPr lang="en-US"/>
           </a:p>
@@ -4051,7 +4552,7 @@
           <a:p>
             <a:fld id="{92122C78-872C-BD46-92C2-FE2D14519D25}" type="datetimeFigureOut">
               <a:rPr lang="en-US" smtClean="0"/>
-              <a:t>1/1/16</a:t>
+              <a:t>1/2/16</a:t>
             </a:fld>
             <a:endParaRPr lang="en-US"/>
           </a:p>
@@ -4264,7 +4765,7 @@
           <a:p>
             <a:fld id="{92122C78-872C-BD46-92C2-FE2D14519D25}" type="datetimeFigureOut">
               <a:rPr lang="en-US" smtClean="0"/>
-              <a:t>1/1/16</a:t>
+              <a:t>1/2/16</a:t>
             </a:fld>
             <a:endParaRPr lang="en-US"/>
           </a:p>
@@ -4738,6 +5239,336 @@
             <a:spLocks noGrp="1"/>
           </p:cNvSpPr>
           <p:nvPr>
+            <p:ph type="ctrTitle"/>
+          </p:nvPr>
+        </p:nvSpPr>
+        <p:spPr/>
+        <p:txBody>
+          <a:bodyPr/>
+          <a:lstStyle/>
+          <a:p>
+            <a:r>
+              <a:rPr lang="en-US" dirty="0" smtClean="0"/>
+              <a:t>Cloud-Native Architecture</a:t>
+            </a:r>
+            <a:endParaRPr lang="en-US" dirty="0"/>
+          </a:p>
+        </p:txBody>
+      </p:sp>
+    </p:spTree>
+    <p:extLst>
+      <p:ext uri="{BB962C8B-B14F-4D97-AF65-F5344CB8AC3E}">
+        <p14:creationId xmlns:p14="http://schemas.microsoft.com/office/powerpoint/2010/main" val="3752186916"/>
+      </p:ext>
+    </p:extLst>
+  </p:cSld>
+  <p:clrMapOvr>
+    <a:masterClrMapping/>
+  </p:clrMapOvr>
+</p:sld>
+</file>
+
+<file path=ppt/slides/slide11.xml><?xml version="1.0" encoding="utf-8"?>
+<p:sld xmlns:a="http://schemas.openxmlformats.org/drawingml/2006/main" xmlns:r="http://schemas.openxmlformats.org/officeDocument/2006/relationships" xmlns:p="http://schemas.openxmlformats.org/presentationml/2006/main">
+  <p:cSld>
+    <p:spTree>
+      <p:nvGrpSpPr>
+        <p:cNvPr id="1" name=""/>
+        <p:cNvGrpSpPr/>
+        <p:nvPr/>
+      </p:nvGrpSpPr>
+      <p:grpSpPr>
+        <a:xfrm>
+          <a:off x="0" y="0"/>
+          <a:ext cx="0" cy="0"/>
+          <a:chOff x="0" y="0"/>
+          <a:chExt cx="0" cy="0"/>
+        </a:xfrm>
+      </p:grpSpPr>
+      <p:sp>
+        <p:nvSpPr>
+          <p:cNvPr id="2" name="Title 1"/>
+          <p:cNvSpPr>
+            <a:spLocks noGrp="1"/>
+          </p:cNvSpPr>
+          <p:nvPr>
+            <p:ph type="title"/>
+          </p:nvPr>
+        </p:nvSpPr>
+        <p:spPr/>
+        <p:txBody>
+          <a:bodyPr>
+            <a:normAutofit fontScale="90000"/>
+          </a:bodyPr>
+          <a:lstStyle/>
+          <a:p>
+            <a:r>
+              <a:rPr lang="en-US" dirty="0" smtClean="0"/>
+              <a:t>Cloud-Native Applications for Delivering Speed &amp; Innovation Safely </a:t>
+            </a:r>
+            <a:endParaRPr lang="en-US" dirty="0"/>
+          </a:p>
+        </p:txBody>
+      </p:sp>
+      <p:sp>
+        <p:nvSpPr>
+          <p:cNvPr id="3" name="Content Placeholder 2"/>
+          <p:cNvSpPr>
+            <a:spLocks noGrp="1"/>
+          </p:cNvSpPr>
+          <p:nvPr>
+            <p:ph idx="1"/>
+          </p:nvPr>
+        </p:nvSpPr>
+        <p:spPr/>
+        <p:txBody>
+          <a:bodyPr>
+            <a:normAutofit/>
+          </a:bodyPr>
+          <a:lstStyle/>
+          <a:p>
+            <a:r>
+              <a:rPr lang="en-US" sz="2400" dirty="0" smtClean="0"/>
+              <a:t>Cloud-native applications are at the center of how disruptive companies such as </a:t>
+            </a:r>
+            <a:r>
+              <a:rPr lang="en-US" sz="2400" dirty="0" err="1" smtClean="0"/>
+              <a:t>Uber</a:t>
+            </a:r>
+            <a:r>
+              <a:rPr lang="en-US" sz="2400" dirty="0" smtClean="0"/>
+              <a:t>, Netflix, Square and </a:t>
+            </a:r>
+            <a:r>
+              <a:rPr lang="en-US" sz="2400" dirty="0" err="1" smtClean="0"/>
+              <a:t>Airbnb</a:t>
+            </a:r>
+            <a:r>
+              <a:rPr lang="en-US" sz="2400" dirty="0" smtClean="0"/>
+              <a:t> are able to provide:</a:t>
+            </a:r>
+          </a:p>
+          <a:p>
+            <a:pPr lvl="1"/>
+            <a:r>
+              <a:rPr lang="en-US" sz="2000" dirty="0" smtClean="0"/>
+              <a:t>New innovation at light speed</a:t>
+            </a:r>
+          </a:p>
+          <a:p>
+            <a:pPr lvl="1"/>
+            <a:r>
+              <a:rPr lang="en-US" sz="2000" dirty="0" smtClean="0"/>
+              <a:t>Always available services</a:t>
+            </a:r>
+          </a:p>
+          <a:p>
+            <a:pPr lvl="1"/>
+            <a:r>
+              <a:rPr lang="en-US" sz="2000" dirty="0" smtClean="0"/>
+              <a:t>Web-scale applications</a:t>
+            </a:r>
+          </a:p>
+          <a:p>
+            <a:pPr lvl="1"/>
+            <a:r>
+              <a:rPr lang="en-US" sz="2000" dirty="0" smtClean="0"/>
+              <a:t>Device agnostic user experiences</a:t>
+            </a:r>
+          </a:p>
+          <a:p>
+            <a:r>
+              <a:rPr lang="en-US" sz="2400" dirty="0" smtClean="0"/>
+              <a:t>Cloud is any computing </a:t>
+            </a:r>
+            <a:r>
+              <a:rPr lang="en-US" sz="2400" dirty="0"/>
+              <a:t>environment in which computing</a:t>
+            </a:r>
+            <a:r>
+              <a:rPr lang="en-US" sz="2400" dirty="0" smtClean="0"/>
+              <a:t>, networking</a:t>
+            </a:r>
+            <a:r>
+              <a:rPr lang="en-US" sz="2400" dirty="0"/>
+              <a:t>, and storage resources can be provisioned and released </a:t>
+            </a:r>
+            <a:r>
+              <a:rPr lang="en-US" sz="2400" dirty="0" smtClean="0"/>
+              <a:t>elastically </a:t>
+            </a:r>
+            <a:r>
+              <a:rPr lang="en-US" sz="2400" dirty="0"/>
+              <a:t>in an on-demand, self-service </a:t>
+            </a:r>
+            <a:r>
+              <a:rPr lang="en-US" sz="2400" dirty="0" smtClean="0"/>
+              <a:t>manner. </a:t>
+            </a:r>
+            <a:endParaRPr lang="en-US" sz="2400" dirty="0" smtClean="0">
+              <a:effectLst/>
+            </a:endParaRPr>
+          </a:p>
+          <a:p>
+            <a:endParaRPr lang="en-US" sz="2400" dirty="0"/>
+          </a:p>
+        </p:txBody>
+      </p:sp>
+    </p:spTree>
+    <p:extLst>
+      <p:ext uri="{BB962C8B-B14F-4D97-AF65-F5344CB8AC3E}">
+        <p14:creationId xmlns:p14="http://schemas.microsoft.com/office/powerpoint/2010/main" val="3819330735"/>
+      </p:ext>
+    </p:extLst>
+  </p:cSld>
+  <p:clrMapOvr>
+    <a:masterClrMapping/>
+  </p:clrMapOvr>
+</p:sld>
+</file>
+
+<file path=ppt/slides/slide12.xml><?xml version="1.0" encoding="utf-8"?>
+<p:sld xmlns:a="http://schemas.openxmlformats.org/drawingml/2006/main" xmlns:r="http://schemas.openxmlformats.org/officeDocument/2006/relationships" xmlns:p="http://schemas.openxmlformats.org/presentationml/2006/main">
+  <p:cSld>
+    <p:spTree>
+      <p:nvGrpSpPr>
+        <p:cNvPr id="1" name=""/>
+        <p:cNvGrpSpPr/>
+        <p:nvPr/>
+      </p:nvGrpSpPr>
+      <p:grpSpPr>
+        <a:xfrm>
+          <a:off x="0" y="0"/>
+          <a:ext cx="0" cy="0"/>
+          <a:chOff x="0" y="0"/>
+          <a:chExt cx="0" cy="0"/>
+        </a:xfrm>
+      </p:grpSpPr>
+      <p:sp>
+        <p:nvSpPr>
+          <p:cNvPr id="2" name="Title 1"/>
+          <p:cNvSpPr>
+            <a:spLocks noGrp="1"/>
+          </p:cNvSpPr>
+          <p:nvPr>
+            <p:ph type="title"/>
+          </p:nvPr>
+        </p:nvSpPr>
+        <p:spPr/>
+        <p:txBody>
+          <a:bodyPr/>
+          <a:lstStyle/>
+          <a:p>
+            <a:r>
+              <a:rPr lang="en-US" dirty="0" smtClean="0"/>
+              <a:t>Speed</a:t>
+            </a:r>
+            <a:endParaRPr lang="en-US" dirty="0"/>
+          </a:p>
+        </p:txBody>
+      </p:sp>
+      <p:sp>
+        <p:nvSpPr>
+          <p:cNvPr id="3" name="Content Placeholder 2"/>
+          <p:cNvSpPr>
+            <a:spLocks noGrp="1"/>
+          </p:cNvSpPr>
+          <p:nvPr>
+            <p:ph idx="1"/>
+          </p:nvPr>
+        </p:nvSpPr>
+        <p:spPr/>
+        <p:txBody>
+          <a:bodyPr>
+            <a:normAutofit/>
+          </a:bodyPr>
+          <a:lstStyle/>
+          <a:p>
+            <a:r>
+              <a:rPr lang="en-US" sz="2400" dirty="0" smtClean="0"/>
+              <a:t>How long would it take Fannie Mae to deploy a change that involves just one single line of code? </a:t>
+            </a:r>
+          </a:p>
+          <a:p>
+            <a:r>
+              <a:rPr lang="en-US" sz="2400" dirty="0"/>
+              <a:t>Provisioning a new application environment by making a call to a cloud service API is faster than a form-based manual process by several orders of </a:t>
+            </a:r>
+            <a:r>
+              <a:rPr lang="en-US" sz="2400" dirty="0" smtClean="0"/>
+              <a:t>magnitude</a:t>
+            </a:r>
+            <a:r>
+              <a:rPr lang="en-US" sz="2400" dirty="0"/>
+              <a:t>. </a:t>
+            </a:r>
+            <a:endParaRPr lang="en-US" sz="2400" dirty="0" smtClean="0"/>
+          </a:p>
+          <a:p>
+            <a:r>
+              <a:rPr lang="en-US" sz="2400" dirty="0"/>
+              <a:t>If you can deploy hundreds of times per day, you can recover from mistakes almost instantly. If you can recover from mistakes almost instantly, you can take on more risk. If you can take on more risk, you can try </a:t>
+            </a:r>
+            <a:r>
+              <a:rPr lang="en-US" sz="2400" dirty="0" smtClean="0"/>
+              <a:t>experiments</a:t>
+            </a:r>
+            <a:r>
+              <a:rPr lang="en-US" sz="2400" dirty="0"/>
+              <a:t>—the results might turn into </a:t>
+            </a:r>
+            <a:r>
+              <a:rPr lang="en-US" sz="2400" dirty="0" smtClean="0"/>
+              <a:t>our </a:t>
+            </a:r>
+            <a:r>
+              <a:rPr lang="en-US" sz="2400" dirty="0"/>
+              <a:t>next competitive advantage. </a:t>
+            </a:r>
+            <a:endParaRPr lang="en-US" sz="2400" dirty="0" smtClean="0"/>
+          </a:p>
+          <a:p>
+            <a:endParaRPr lang="en-US" dirty="0"/>
+          </a:p>
+        </p:txBody>
+      </p:sp>
+    </p:spTree>
+    <p:extLst>
+      <p:ext uri="{BB962C8B-B14F-4D97-AF65-F5344CB8AC3E}">
+        <p14:creationId xmlns:p14="http://schemas.microsoft.com/office/powerpoint/2010/main" val="3122462795"/>
+      </p:ext>
+    </p:extLst>
+  </p:cSld>
+  <p:clrMapOvr>
+    <a:masterClrMapping/>
+  </p:clrMapOvr>
+</p:sld>
+</file>
+
+<file path=ppt/slides/slide13.xml><?xml version="1.0" encoding="utf-8"?>
+<p:sld xmlns:a="http://schemas.openxmlformats.org/drawingml/2006/main" xmlns:r="http://schemas.openxmlformats.org/officeDocument/2006/relationships" xmlns:p="http://schemas.openxmlformats.org/presentationml/2006/main">
+  <p:cSld>
+    <p:spTree>
+      <p:nvGrpSpPr>
+        <p:cNvPr id="1" name=""/>
+        <p:cNvGrpSpPr/>
+        <p:nvPr/>
+      </p:nvGrpSpPr>
+      <p:grpSpPr>
+        <a:xfrm>
+          <a:off x="0" y="0"/>
+          <a:ext cx="0" cy="0"/>
+          <a:chOff x="0" y="0"/>
+          <a:chExt cx="0" cy="0"/>
+        </a:xfrm>
+      </p:grpSpPr>
+      <p:sp>
+        <p:nvSpPr>
+          <p:cNvPr id="2" name="Title 1"/>
+          <p:cNvSpPr>
+            <a:spLocks noGrp="1"/>
+          </p:cNvSpPr>
+          <p:nvPr>
             <p:ph type="title"/>
           </p:nvPr>
         </p:nvSpPr>
@@ -4826,7 +5657,7 @@
 </p:sld>
 </file>
 
-<file path=ppt/slides/slide11.xml><?xml version="1.0" encoding="utf-8"?>
+<file path=ppt/slides/slide14.xml><?xml version="1.0" encoding="utf-8"?>
 <p:sld xmlns:a="http://schemas.openxmlformats.org/drawingml/2006/main" xmlns:r="http://schemas.openxmlformats.org/officeDocument/2006/relationships" xmlns:p="http://schemas.openxmlformats.org/presentationml/2006/main">
   <p:cSld>
     <p:spTree>
@@ -5006,11 +5837,7 @@
             </a:r>
             <a:r>
               <a:rPr lang="en-US" b="1" dirty="0" smtClean="0"/>
-              <a:t>Micro</a:t>
-            </a:r>
-            <a:r>
-              <a:rPr lang="en-US" b="1" dirty="0" smtClean="0"/>
-              <a:t>-services for Continuous Delivery</a:t>
+              <a:t>Micro-services for Continuous Delivery</a:t>
             </a:r>
           </a:p>
           <a:p>
@@ -5573,8 +6400,12 @@
           <a:lstStyle/>
           <a:p>
             <a:r>
-              <a:rPr lang="en-US" dirty="0" smtClean="0"/>
-              <a:t>Cloud-Native Architecture</a:t>
+              <a:rPr lang="en-US" i="1" dirty="0" smtClean="0"/>
+              <a:t>12 Factor </a:t>
+            </a:r>
+            <a:r>
+              <a:rPr lang="en-US" dirty="0" smtClean="0"/>
+              <a:t>Methodology</a:t>
             </a:r>
             <a:endParaRPr lang="en-US" dirty="0"/>
           </a:p>
@@ -5583,7 +6414,7 @@
     </p:spTree>
     <p:extLst>
       <p:ext uri="{BB962C8B-B14F-4D97-AF65-F5344CB8AC3E}">
-        <p14:creationId xmlns:p14="http://schemas.microsoft.com/office/powerpoint/2010/main" val="3752186916"/>
+        <p14:creationId xmlns:p14="http://schemas.microsoft.com/office/powerpoint/2010/main" val="353178583"/>
       </p:ext>
     </p:extLst>
   </p:cSld>
@@ -5622,127 +6453,110 @@
         </p:nvSpPr>
         <p:spPr/>
         <p:txBody>
+          <a:bodyPr/>
+          <a:lstStyle/>
+          <a:p>
+            <a:r>
+              <a:rPr lang="en-US" dirty="0" smtClean="0"/>
+              <a:t>12 Factor Apps </a:t>
+            </a:r>
+            <a:r>
+              <a:rPr lang="is-IS" dirty="0" smtClean="0"/>
+              <a:t>…</a:t>
+            </a:r>
+            <a:endParaRPr lang="en-US" dirty="0"/>
+          </a:p>
+        </p:txBody>
+      </p:sp>
+      <p:sp>
+        <p:nvSpPr>
+          <p:cNvPr id="3" name="Content Placeholder 2"/>
+          <p:cNvSpPr>
+            <a:spLocks noGrp="1"/>
+          </p:cNvSpPr>
+          <p:nvPr>
+            <p:ph idx="1"/>
+          </p:nvPr>
+        </p:nvSpPr>
+        <p:spPr/>
+        <p:txBody>
           <a:bodyPr>
-            <a:normAutofit fontScale="90000"/>
+            <a:normAutofit fontScale="77500" lnSpcReduction="20000"/>
           </a:bodyPr>
           <a:lstStyle/>
           <a:p>
             <a:r>
-              <a:rPr lang="en-US" dirty="0" smtClean="0"/>
-              <a:t>Cloud-Native Applications for Delivering Speed &amp; Innovation Safely </a:t>
+              <a:rPr lang="en-US" dirty="0"/>
+              <a:t>Use declarative formats for setup automation, to minimize time and cost for new developers joining the </a:t>
+            </a:r>
+            <a:r>
+              <a:rPr lang="en-US" dirty="0" smtClean="0"/>
+              <a:t>project</a:t>
+            </a:r>
+          </a:p>
+          <a:p>
+            <a:r>
+              <a:rPr lang="en-US" dirty="0" smtClean="0"/>
+              <a:t>Have </a:t>
+            </a:r>
+            <a:r>
+              <a:rPr lang="en-US" dirty="0"/>
+              <a:t>a clean contract with the underlying operating system, offering maximum portability between execution </a:t>
+            </a:r>
+            <a:r>
+              <a:rPr lang="en-US" dirty="0" smtClean="0"/>
+              <a:t>environments</a:t>
+            </a:r>
+          </a:p>
+          <a:p>
+            <a:r>
+              <a:rPr lang="en-US" dirty="0" smtClean="0"/>
+              <a:t>Are </a:t>
+            </a:r>
+            <a:r>
+              <a:rPr lang="en-US" dirty="0"/>
+              <a:t>suitable for deployment on modern cloud platforms, obviating the need for servers and systems </a:t>
+            </a:r>
+            <a:r>
+              <a:rPr lang="en-US" dirty="0" smtClean="0"/>
+              <a:t>administration</a:t>
+            </a:r>
+          </a:p>
+          <a:p>
+            <a:r>
+              <a:rPr lang="en-US" dirty="0" smtClean="0"/>
+              <a:t>Minimize </a:t>
+            </a:r>
+            <a:r>
+              <a:rPr lang="en-US" dirty="0"/>
+              <a:t>divergence between development and production, enabling continuous deployment for maximum </a:t>
+            </a:r>
+            <a:r>
+              <a:rPr lang="en-US" dirty="0" smtClean="0"/>
+              <a:t>agility</a:t>
+            </a:r>
+          </a:p>
+          <a:p>
+            <a:r>
+              <a:rPr lang="en-US" dirty="0" smtClean="0"/>
+              <a:t>Can </a:t>
+            </a:r>
+            <a:r>
+              <a:rPr lang="en-US" dirty="0"/>
+              <a:t>scale up without significant changes to tooling, architecture, or development </a:t>
+            </a:r>
+            <a:r>
+              <a:rPr lang="en-US" dirty="0" smtClean="0"/>
+              <a:t>practices</a:t>
             </a:r>
             <a:endParaRPr lang="en-US" dirty="0"/>
-          </a:p>
-        </p:txBody>
-      </p:sp>
-      <p:sp>
-        <p:nvSpPr>
-          <p:cNvPr id="3" name="Content Placeholder 2"/>
-          <p:cNvSpPr>
-            <a:spLocks noGrp="1"/>
-          </p:cNvSpPr>
-          <p:nvPr>
-            <p:ph idx="1"/>
-          </p:nvPr>
-        </p:nvSpPr>
-        <p:spPr/>
-        <p:txBody>
-          <a:bodyPr>
-            <a:normAutofit/>
-          </a:bodyPr>
-          <a:lstStyle/>
-          <a:p>
-            <a:r>
-              <a:rPr lang="en-US" sz="2400" dirty="0" smtClean="0"/>
-              <a:t>Cloud-native applications are at the center of how disruptive companies such as </a:t>
-            </a:r>
-            <a:r>
-              <a:rPr lang="en-US" sz="2400" dirty="0" err="1" smtClean="0"/>
-              <a:t>Uber</a:t>
-            </a:r>
-            <a:r>
-              <a:rPr lang="en-US" sz="2400" dirty="0" smtClean="0"/>
-              <a:t>, Netflix, Square and </a:t>
-            </a:r>
-            <a:r>
-              <a:rPr lang="en-US" sz="2400" dirty="0" err="1" smtClean="0"/>
-              <a:t>Airbnb</a:t>
-            </a:r>
-            <a:r>
-              <a:rPr lang="en-US" sz="2400" dirty="0" smtClean="0"/>
-              <a:t> are able to provide:</a:t>
-            </a:r>
-          </a:p>
-          <a:p>
-            <a:pPr lvl="1"/>
-            <a:r>
-              <a:rPr lang="en-US" sz="2000" dirty="0" smtClean="0"/>
-              <a:t>New innovation at light speed</a:t>
-            </a:r>
-          </a:p>
-          <a:p>
-            <a:pPr lvl="1"/>
-            <a:r>
-              <a:rPr lang="en-US" sz="2000" dirty="0" smtClean="0"/>
-              <a:t>Always available services</a:t>
-            </a:r>
-          </a:p>
-          <a:p>
-            <a:pPr lvl="1"/>
-            <a:r>
-              <a:rPr lang="en-US" sz="2000" dirty="0" smtClean="0"/>
-              <a:t>Web-scale applications</a:t>
-            </a:r>
-          </a:p>
-          <a:p>
-            <a:pPr lvl="1"/>
-            <a:r>
-              <a:rPr lang="en-US" sz="2000" dirty="0" smtClean="0"/>
-              <a:t>Device agnostic user experiences</a:t>
-            </a:r>
-          </a:p>
-          <a:p>
-            <a:r>
-              <a:rPr lang="en-US" sz="2400" dirty="0" smtClean="0"/>
-              <a:t>Cloud is any computing </a:t>
-            </a:r>
-            <a:r>
-              <a:rPr lang="en-US" sz="2400" dirty="0"/>
-              <a:t>environment in which computing</a:t>
-            </a:r>
-            <a:r>
-              <a:rPr lang="en-US" sz="2400" dirty="0" smtClean="0"/>
-              <a:t>, networking</a:t>
-            </a:r>
-            <a:r>
-              <a:rPr lang="en-US" sz="2400" dirty="0"/>
-              <a:t>, and storage resources can be provisioned and released </a:t>
-            </a:r>
-            <a:r>
-              <a:rPr lang="en-US" sz="2400" dirty="0" smtClean="0"/>
-              <a:t>elastically </a:t>
-            </a:r>
-            <a:r>
-              <a:rPr lang="en-US" sz="2400" dirty="0"/>
-              <a:t>in an on-demand, self-service </a:t>
-            </a:r>
-            <a:r>
-              <a:rPr lang="en-US" sz="2400" dirty="0" smtClean="0"/>
-              <a:t>manner. </a:t>
-            </a:r>
-            <a:endParaRPr lang="en-US" sz="2400" dirty="0" smtClean="0">
-              <a:effectLst/>
-            </a:endParaRPr>
-          </a:p>
-          <a:p>
-            <a:endParaRPr lang="en-US" sz="2400" dirty="0"/>
           </a:p>
         </p:txBody>
       </p:sp>
     </p:spTree>
     <p:extLst>
       <p:ext uri="{BB962C8B-B14F-4D97-AF65-F5344CB8AC3E}">
-        <p14:creationId xmlns:p14="http://schemas.microsoft.com/office/powerpoint/2010/main" val="3819330735"/>
+        <p14:creationId xmlns:p14="http://schemas.microsoft.com/office/powerpoint/2010/main" val="474880326"/>
       </p:ext>
     </p:extLst>
   </p:cSld>
@@ -5786,7 +6600,7 @@
           <a:p>
             <a:r>
               <a:rPr lang="en-US" dirty="0" smtClean="0"/>
-              <a:t>Speed</a:t>
+              <a:t>12 Factors</a:t>
             </a:r>
             <a:endParaRPr lang="en-US" dirty="0"/>
           </a:p>
@@ -5805,54 +6619,196 @@
         <p:spPr/>
         <p:txBody>
           <a:bodyPr>
-            <a:normAutofit/>
+            <a:normAutofit fontScale="62500" lnSpcReduction="20000"/>
           </a:bodyPr>
           <a:lstStyle/>
           <a:p>
-            <a:r>
-              <a:rPr lang="en-US" sz="2400" dirty="0" smtClean="0"/>
-              <a:t>How long would it take Fannie Mae to deploy a change that involves just one single line of code? </a:t>
-            </a:r>
-          </a:p>
-          <a:p>
-            <a:r>
-              <a:rPr lang="en-US" sz="2400" dirty="0"/>
-              <a:t>Provisioning a new application environment by making a call to a cloud service API is faster than a form-based manual process by several orders of </a:t>
-            </a:r>
-            <a:r>
-              <a:rPr lang="en-US" sz="2400" dirty="0" smtClean="0"/>
-              <a:t>magnitude</a:t>
-            </a:r>
-            <a:r>
-              <a:rPr lang="en-US" sz="2400" dirty="0"/>
-              <a:t>. </a:t>
-            </a:r>
-            <a:endParaRPr lang="en-US" sz="2400" dirty="0" smtClean="0"/>
-          </a:p>
-          <a:p>
-            <a:r>
-              <a:rPr lang="en-US" sz="2400" dirty="0"/>
-              <a:t>If you can deploy hundreds of times per day, you can recover from mistakes almost instantly. If you can recover from mistakes almost instantly, you can take on more risk. If you can take on more risk, you can try </a:t>
-            </a:r>
-            <a:r>
-              <a:rPr lang="en-US" sz="2400" dirty="0" smtClean="0"/>
-              <a:t>experiments</a:t>
-            </a:r>
-            <a:r>
-              <a:rPr lang="en-US" sz="2400" dirty="0"/>
-              <a:t>—the results might turn into </a:t>
-            </a:r>
-            <a:r>
-              <a:rPr lang="en-US" sz="2400" dirty="0" smtClean="0"/>
-              <a:t>our </a:t>
-            </a:r>
-            <a:r>
-              <a:rPr lang="en-US" sz="2400" dirty="0"/>
-              <a:t>next competitive advantage. </a:t>
-            </a:r>
-            <a:endParaRPr lang="en-US" sz="2400" dirty="0" smtClean="0"/>
-          </a:p>
-          <a:p>
+            <a:pPr marL="571500" indent="-571500">
+              <a:buFont typeface="+mj-lt"/>
+              <a:buAutoNum type="romanUcPeriod"/>
+            </a:pPr>
+            <a:r>
+              <a:rPr lang="en-US" b="1" dirty="0" smtClean="0"/>
+              <a:t>Codebase</a:t>
+            </a:r>
+            <a:r>
+              <a:rPr lang="en-US" dirty="0" smtClean="0"/>
+              <a:t> - One </a:t>
+            </a:r>
+            <a:r>
+              <a:rPr lang="en-US" dirty="0"/>
+              <a:t>codebase tracked in revision control, many </a:t>
+            </a:r>
+            <a:r>
+              <a:rPr lang="en-US" dirty="0" smtClean="0"/>
+              <a:t>deploys</a:t>
+            </a:r>
+          </a:p>
+          <a:p>
+            <a:pPr marL="571500" indent="-571500">
+              <a:buFont typeface="+mj-lt"/>
+              <a:buAutoNum type="romanUcPeriod"/>
+            </a:pPr>
+            <a:r>
+              <a:rPr lang="en-US" b="1" dirty="0" smtClean="0"/>
+              <a:t>Dependencies</a:t>
+            </a:r>
+            <a:r>
+              <a:rPr lang="en-US" dirty="0" smtClean="0"/>
+              <a:t> - Explicitly declare and isolate dependencies (“carry-ons”)</a:t>
+            </a:r>
+          </a:p>
+          <a:p>
+            <a:pPr marL="571500" indent="-571500">
+              <a:buFont typeface="+mj-lt"/>
+              <a:buAutoNum type="romanUcPeriod"/>
+            </a:pPr>
+            <a:r>
+              <a:rPr lang="en-US" b="1" dirty="0" err="1" smtClean="0"/>
+              <a:t>Config</a:t>
+            </a:r>
+            <a:r>
+              <a:rPr lang="en-US" dirty="0" smtClean="0"/>
+              <a:t> - Store </a:t>
+            </a:r>
+            <a:r>
+              <a:rPr lang="en-US" dirty="0" err="1" smtClean="0"/>
+              <a:t>config</a:t>
+            </a:r>
+            <a:r>
+              <a:rPr lang="en-US" dirty="0" smtClean="0"/>
+              <a:t> in the </a:t>
+            </a:r>
+            <a:r>
+              <a:rPr lang="en-US" b="1" i="1" dirty="0" smtClean="0"/>
+              <a:t>environment </a:t>
+            </a:r>
+          </a:p>
+          <a:p>
+            <a:pPr marL="571500" indent="-571500">
+              <a:buFont typeface="+mj-lt"/>
+              <a:buAutoNum type="romanUcPeriod"/>
+            </a:pPr>
+            <a:r>
+              <a:rPr lang="en-US" b="1" dirty="0" smtClean="0"/>
+              <a:t>Backing Services </a:t>
+            </a:r>
+            <a:r>
+              <a:rPr lang="en-US" dirty="0" smtClean="0"/>
+              <a:t>- Treat backing services as attached resources</a:t>
+            </a:r>
+          </a:p>
+          <a:p>
+            <a:pPr marL="571500" indent="-571500">
+              <a:buFont typeface="+mj-lt"/>
+              <a:buAutoNum type="romanUcPeriod"/>
+            </a:pPr>
+            <a:r>
+              <a:rPr lang="en-US" b="1" dirty="0" smtClean="0"/>
+              <a:t>Build, release, run </a:t>
+            </a:r>
+            <a:r>
+              <a:rPr lang="en-US" dirty="0" smtClean="0"/>
+              <a:t>- Strictly separate build and run stages</a:t>
+            </a:r>
+          </a:p>
+          <a:p>
+            <a:pPr marL="571500" indent="-571500">
+              <a:buFont typeface="+mj-lt"/>
+              <a:buAutoNum type="romanUcPeriod"/>
+            </a:pPr>
+            <a:r>
+              <a:rPr lang="en-US" b="1" dirty="0" smtClean="0"/>
+              <a:t>Processes</a:t>
+            </a:r>
+            <a:r>
+              <a:rPr lang="en-US" dirty="0" smtClean="0"/>
+              <a:t> - Execute the app as one or more stateless processes</a:t>
+            </a:r>
+          </a:p>
+          <a:p>
+            <a:pPr marL="571500" indent="-571500">
+              <a:buFont typeface="+mj-lt"/>
+              <a:buAutoNum type="romanUcPeriod"/>
+            </a:pPr>
+            <a:r>
+              <a:rPr lang="en-US" b="1" dirty="0" smtClean="0"/>
+              <a:t>Port binding </a:t>
+            </a:r>
+            <a:r>
+              <a:rPr lang="en-US" dirty="0" smtClean="0"/>
+              <a:t>- Export services via port binding</a:t>
+            </a:r>
+          </a:p>
+          <a:p>
+            <a:pPr marL="571500" indent="-571500">
+              <a:buFont typeface="+mj-lt"/>
+              <a:buAutoNum type="romanUcPeriod"/>
+            </a:pPr>
+            <a:r>
+              <a:rPr lang="en-US" b="1" dirty="0" smtClean="0"/>
+              <a:t>Concurrency</a:t>
+            </a:r>
+            <a:r>
+              <a:rPr lang="en-US" dirty="0" smtClean="0"/>
+              <a:t> - Scale out via the process model</a:t>
+            </a:r>
+          </a:p>
+          <a:p>
+            <a:pPr marL="571500" indent="-571500">
+              <a:buFont typeface="+mj-lt"/>
+              <a:buAutoNum type="romanUcPeriod"/>
+            </a:pPr>
+            <a:r>
+              <a:rPr lang="en-US" b="1" dirty="0" smtClean="0"/>
+              <a:t>Disposability</a:t>
+            </a:r>
+            <a:r>
+              <a:rPr lang="en-US" dirty="0" smtClean="0"/>
+              <a:t> - Maximize robustness with fast startup and graceful shutdown</a:t>
+            </a:r>
+          </a:p>
+          <a:p>
+            <a:pPr marL="571500" indent="-571500">
+              <a:buFont typeface="+mj-lt"/>
+              <a:buAutoNum type="romanUcPeriod"/>
+            </a:pPr>
+            <a:r>
+              <a:rPr lang="en-US" b="1" dirty="0" smtClean="0"/>
+              <a:t>Dev/prod parity </a:t>
+            </a:r>
+            <a:r>
+              <a:rPr lang="en-US" dirty="0" smtClean="0"/>
+              <a:t>- Keep development, staging, and production as similar as possible</a:t>
+            </a:r>
+          </a:p>
+          <a:p>
+            <a:pPr marL="571500" indent="-571500">
+              <a:buFont typeface="+mj-lt"/>
+              <a:buAutoNum type="romanUcPeriod"/>
+            </a:pPr>
+            <a:r>
+              <a:rPr lang="en-US" b="1" dirty="0" smtClean="0"/>
+              <a:t>Logs</a:t>
+            </a:r>
+            <a:r>
+              <a:rPr lang="en-US" dirty="0" smtClean="0"/>
+              <a:t> - Treat logs as event streams</a:t>
+            </a:r>
+          </a:p>
+          <a:p>
+            <a:pPr marL="571500" indent="-571500">
+              <a:buFont typeface="+mj-lt"/>
+              <a:buAutoNum type="romanUcPeriod"/>
+            </a:pPr>
+            <a:r>
+              <a:rPr lang="en-US" b="1" dirty="0" smtClean="0"/>
+              <a:t>Admin processes </a:t>
+            </a:r>
+            <a:r>
+              <a:rPr lang="en-US" dirty="0" smtClean="0"/>
+              <a:t>- Run admin/management tasks as one-off processes</a:t>
+            </a:r>
             <a:endParaRPr lang="en-US" dirty="0"/>
           </a:p>
         </p:txBody>
@@ -5860,7 +6816,7 @@
     </p:spTree>
     <p:extLst>
       <p:ext uri="{BB962C8B-B14F-4D97-AF65-F5344CB8AC3E}">
-        <p14:creationId xmlns:p14="http://schemas.microsoft.com/office/powerpoint/2010/main" val="3122462795"/>
+        <p14:creationId xmlns:p14="http://schemas.microsoft.com/office/powerpoint/2010/main" val="1519099672"/>
       </p:ext>
     </p:extLst>
   </p:cSld>

</xml_diff>